<commit_message>
Update Project review 2 ppt[1].pptx
</commit_message>
<xml_diff>
--- a/Project review 2 ppt[1].pptx
+++ b/Project review 2 ppt[1].pptx
@@ -5,10 +5,10 @@
     <p:sldMasterId id="2147483648" r:id="rId1"/>
   </p:sldMasterIdLst>
   <p:notesMasterIdLst>
-    <p:notesMasterId r:id="rId14"/>
+    <p:notesMasterId r:id="rId15"/>
   </p:notesMasterIdLst>
   <p:handoutMasterIdLst>
-    <p:handoutMasterId r:id="rId15"/>
+    <p:handoutMasterId r:id="rId16"/>
   </p:handoutMasterIdLst>
   <p:sldIdLst>
     <p:sldId id="531" r:id="rId2"/>
@@ -21,59 +21,60 @@
     <p:sldId id="532" r:id="rId9"/>
     <p:sldId id="535" r:id="rId10"/>
     <p:sldId id="536" r:id="rId11"/>
-    <p:sldId id="307" r:id="rId12"/>
-    <p:sldId id="301" r:id="rId13"/>
+    <p:sldId id="537" r:id="rId12"/>
+    <p:sldId id="307" r:id="rId13"/>
+    <p:sldId id="301" r:id="rId14"/>
   </p:sldIdLst>
   <p:sldSz cx="12192000" cy="6858000"/>
   <p:notesSz cx="6858000" cy="9144000"/>
   <p:embeddedFontLst>
     <p:embeddedFont>
       <p:font typeface="Aharoni" panose="02010803020104030203" pitchFamily="2" charset="-79"/>
-      <p:bold r:id="rId16"/>
+      <p:bold r:id="rId17"/>
     </p:embeddedFont>
     <p:embeddedFont>
       <p:font typeface="Montserrat" panose="00000500000000000000" pitchFamily="2" charset="0"/>
-      <p:regular r:id="rId17"/>
-      <p:bold r:id="rId18"/>
-      <p:italic r:id="rId19"/>
-      <p:boldItalic r:id="rId20"/>
+      <p:regular r:id="rId18"/>
+      <p:bold r:id="rId19"/>
+      <p:italic r:id="rId20"/>
+      <p:boldItalic r:id="rId21"/>
     </p:embeddedFont>
     <p:embeddedFont>
       <p:font typeface="Montserrat Medium" panose="00000600000000000000" pitchFamily="2" charset="0"/>
-      <p:regular r:id="rId21"/>
-      <p:italic r:id="rId22"/>
+      <p:regular r:id="rId22"/>
+      <p:italic r:id="rId23"/>
     </p:embeddedFont>
     <p:embeddedFont>
       <p:font typeface="Open Sans" panose="020B0606030504020204" pitchFamily="34" charset="0"/>
-      <p:regular r:id="rId23"/>
-      <p:bold r:id="rId24"/>
-      <p:italic r:id="rId25"/>
-      <p:boldItalic r:id="rId26"/>
+      <p:regular r:id="rId24"/>
+      <p:bold r:id="rId25"/>
+      <p:italic r:id="rId26"/>
+      <p:boldItalic r:id="rId27"/>
     </p:embeddedFont>
     <p:embeddedFont>
       <p:font typeface="Plus Jakarta Sans" panose="020B0604020202020204" charset="0"/>
-      <p:regular r:id="rId27"/>
-      <p:bold r:id="rId28"/>
-      <p:italic r:id="rId29"/>
-      <p:boldItalic r:id="rId30"/>
+      <p:regular r:id="rId28"/>
+      <p:bold r:id="rId29"/>
+      <p:italic r:id="rId30"/>
+      <p:boldItalic r:id="rId31"/>
     </p:embeddedFont>
     <p:embeddedFont>
       <p:font typeface="Poppins SemiBold" panose="00000700000000000000" pitchFamily="2" charset="0"/>
-      <p:regular r:id="rId31"/>
-      <p:bold r:id="rId32"/>
-      <p:italic r:id="rId33"/>
-      <p:boldItalic r:id="rId34"/>
+      <p:regular r:id="rId32"/>
+      <p:bold r:id="rId33"/>
+      <p:italic r:id="rId34"/>
+      <p:boldItalic r:id="rId35"/>
     </p:embeddedFont>
     <p:embeddedFont>
       <p:font typeface="Verdana" panose="020B0604030504040204" pitchFamily="34" charset="0"/>
-      <p:regular r:id="rId35"/>
-      <p:bold r:id="rId36"/>
-      <p:italic r:id="rId37"/>
-      <p:boldItalic r:id="rId38"/>
+      <p:regular r:id="rId36"/>
+      <p:bold r:id="rId37"/>
+      <p:italic r:id="rId38"/>
+      <p:boldItalic r:id="rId39"/>
     </p:embeddedFont>
   </p:embeddedFontLst>
   <p:custDataLst>
-    <p:tags r:id="rId39"/>
+    <p:tags r:id="rId40"/>
   </p:custDataLst>
   <p:defaultTextStyle>
     <a:defPPr marR="0" lvl="0" algn="l" rtl="0">
@@ -312,7 +313,7 @@
       <p15:notesGuideLst xmlns:p15="http://schemas.microsoft.com/office/powerpoint/2012/main"/>
     </p:ext>
     <p:ext uri="GoogleSlidesCustomDataVersion2">
-      <go:slidesCustomData xmlns:go="http://customooxmlschemas.google.com/" xmlns:ahyp="http://schemas.microsoft.com/office/drawing/2018/hyperlinkcolor" xmlns:p15="http://schemas.microsoft.com/office/powerpoint/2012/main" xmlns:p14="http://schemas.microsoft.com/office/powerpoint/2010/main" xmlns:com="http://schemas.openxmlformats.org/drawingml/2006/compatibility" xmlns:pvml="urn:schemas-microsoft-com:office:powerpoint" xmlns:v="urn:schemas-microsoft-com:vml" xmlns:o="urn:schemas-microsoft-com:office:office" xmlns:dgm="http://schemas.openxmlformats.org/drawingml/2006/diagram" xmlns:c="http://schemas.openxmlformats.org/drawingml/2006/chart" xmlns:mv="urn:schemas-microsoft-com:mac:vml" xmlns:mc="http://schemas.openxmlformats.org/markup-compatibility/2006" xmlns="" r:id="rId87" roundtripDataSignature="AMtx7miIyBGqFJiBIVMPSSJVJ08VgmQ4iw=="/>
+      <go:slidesCustomData xmlns="" xmlns:mc="http://schemas.openxmlformats.org/markup-compatibility/2006" xmlns:mv="urn:schemas-microsoft-com:mac:vml" xmlns:c="http://schemas.openxmlformats.org/drawingml/2006/chart" xmlns:dgm="http://schemas.openxmlformats.org/drawingml/2006/diagram" xmlns:o="urn:schemas-microsoft-com:office:office" xmlns:v="urn:schemas-microsoft-com:vml" xmlns:pvml="urn:schemas-microsoft-com:office:powerpoint" xmlns:com="http://schemas.openxmlformats.org/drawingml/2006/compatibility" xmlns:p14="http://schemas.microsoft.com/office/powerpoint/2010/main" xmlns:p15="http://schemas.microsoft.com/office/powerpoint/2012/main" xmlns:ahyp="http://schemas.microsoft.com/office/drawing/2018/hyperlinkcolor" xmlns:go="http://customooxmlschemas.google.com/" r:id="rId87" roundtripDataSignature="AMtx7miIyBGqFJiBIVMPSSJVJ08VgmQ4iw=="/>
     </p:ext>
   </p:extLst>
 </p:presentation>
@@ -8113,6 +8114,780 @@
         <p:cNvPr id="1" name="">
           <a:extLst>
             <a:ext uri="{FF2B5EF4-FFF2-40B4-BE49-F238E27FC236}">
+              <a16:creationId xmlns:a16="http://schemas.microsoft.com/office/drawing/2014/main" id="{F669120D-51B8-0921-89F6-D463887BF23B}"/>
+            </a:ext>
+          </a:extLst>
+        </p:cNvPr>
+        <p:cNvGrpSpPr/>
+        <p:nvPr/>
+      </p:nvGrpSpPr>
+      <p:grpSpPr>
+        <a:xfrm>
+          <a:off x="0" y="0"/>
+          <a:ext cx="0" cy="0"/>
+          <a:chOff x="0" y="0"/>
+          <a:chExt cx="0" cy="0"/>
+        </a:xfrm>
+      </p:grpSpPr>
+      <p:sp>
+        <p:nvSpPr>
+          <p:cNvPr id="3" name="Slide Number Placeholder 2">
+            <a:extLst>
+              <a:ext uri="{FF2B5EF4-FFF2-40B4-BE49-F238E27FC236}">
+                <a16:creationId xmlns:a16="http://schemas.microsoft.com/office/drawing/2014/main" id="{4AD02C74-C33F-EEF5-BE49-9F8E25B52B00}"/>
+              </a:ext>
+            </a:extLst>
+          </p:cNvPr>
+          <p:cNvSpPr>
+            <a:spLocks noGrp="1"/>
+          </p:cNvSpPr>
+          <p:nvPr>
+            <p:ph type="sldNum" idx="12"/>
+          </p:nvPr>
+        </p:nvSpPr>
+        <p:spPr/>
+        <p:txBody>
+          <a:bodyPr/>
+          <a:lstStyle/>
+          <a:p>
+            <a:pPr marL="0" lvl="0" indent="0" algn="r" rtl="0">
+              <a:spcBef>
+                <a:spcPts val="0"/>
+              </a:spcBef>
+              <a:spcAft>
+                <a:spcPts val="0"/>
+              </a:spcAft>
+              <a:buNone/>
+            </a:pPr>
+            <a:fld id="{00000000-1234-1234-1234-123412341234}" type="slidenum">
+              <a:rPr lang="en-US" smtClean="0"/>
+              <a:t>11</a:t>
+            </a:fld>
+            <a:endParaRPr lang="en-US" dirty="0"/>
+          </a:p>
+        </p:txBody>
+      </p:sp>
+      <p:sp>
+        <p:nvSpPr>
+          <p:cNvPr id="5" name="TextBox 4">
+            <a:extLst>
+              <a:ext uri="{FF2B5EF4-FFF2-40B4-BE49-F238E27FC236}">
+                <a16:creationId xmlns:a16="http://schemas.microsoft.com/office/drawing/2014/main" id="{AE0B5ABD-44D6-C577-5BAC-3B647604D89D}"/>
+              </a:ext>
+            </a:extLst>
+          </p:cNvPr>
+          <p:cNvSpPr txBox="1"/>
+          <p:nvPr/>
+        </p:nvSpPr>
+        <p:spPr>
+          <a:xfrm>
+            <a:off x="2783072" y="128724"/>
+            <a:ext cx="6182832" cy="400110"/>
+          </a:xfrm>
+          <a:prstGeom prst="rect">
+            <a:avLst/>
+          </a:prstGeom>
+          <a:noFill/>
+        </p:spPr>
+        <p:txBody>
+          <a:bodyPr wrap="square">
+            <a:spAutoFit/>
+          </a:bodyPr>
+          <a:lstStyle/>
+          <a:p>
+            <a:pPr marL="0" marR="0" lvl="0" indent="0" algn="ctr" rtl="0">
+              <a:lnSpc>
+                <a:spcPct val="100000"/>
+              </a:lnSpc>
+              <a:spcBef>
+                <a:spcPts val="0"/>
+              </a:spcBef>
+              <a:spcAft>
+                <a:spcPts val="0"/>
+              </a:spcAft>
+              <a:buClr>
+                <a:srgbClr val="000000"/>
+              </a:buClr>
+              <a:buSzPts val="2400"/>
+              <a:buFont typeface="Arial"/>
+              <a:buNone/>
+            </a:pPr>
+            <a:r>
+              <a:rPr lang="en-US" sz="2000" b="1" i="0" u="none" strike="noStrike" cap="none" dirty="0">
+                <a:solidFill>
+                  <a:srgbClr val="000000"/>
+                </a:solidFill>
+                <a:latin typeface="Montserrat"/>
+                <a:ea typeface="Montserrat"/>
+                <a:cs typeface="Montserrat"/>
+                <a:sym typeface="Montserrat"/>
+              </a:rPr>
+              <a:t>Simulation Output - </a:t>
+            </a:r>
+            <a:r>
+              <a:rPr lang="en-US" sz="2000" b="1" i="0" u="none" strike="noStrike" cap="none" dirty="0" err="1">
+                <a:solidFill>
+                  <a:srgbClr val="000000"/>
+                </a:solidFill>
+                <a:latin typeface="Montserrat"/>
+                <a:ea typeface="Montserrat"/>
+                <a:cs typeface="Montserrat"/>
+                <a:sym typeface="Montserrat"/>
+              </a:rPr>
+              <a:t>Vivado</a:t>
+            </a:r>
+            <a:endParaRPr lang="en-US" sz="2000" b="0" i="0" u="none" strike="noStrike" cap="none" dirty="0">
+              <a:solidFill>
+                <a:srgbClr val="000000"/>
+              </a:solidFill>
+              <a:latin typeface="Arial"/>
+              <a:ea typeface="Arial"/>
+              <a:cs typeface="Arial"/>
+              <a:sym typeface="Arial"/>
+            </a:endParaRPr>
+          </a:p>
+        </p:txBody>
+      </p:sp>
+      <p:sp>
+        <p:nvSpPr>
+          <p:cNvPr id="2" name="TextBox 1">
+            <a:extLst>
+              <a:ext uri="{FF2B5EF4-FFF2-40B4-BE49-F238E27FC236}">
+                <a16:creationId xmlns:a16="http://schemas.microsoft.com/office/drawing/2014/main" id="{5F77D097-7040-3B8D-D922-B55EE41636C2}"/>
+              </a:ext>
+            </a:extLst>
+          </p:cNvPr>
+          <p:cNvSpPr txBox="1"/>
+          <p:nvPr/>
+        </p:nvSpPr>
+        <p:spPr>
+          <a:xfrm>
+            <a:off x="0" y="667512"/>
+            <a:ext cx="4709160" cy="3323987"/>
+          </a:xfrm>
+          <a:prstGeom prst="rect">
+            <a:avLst/>
+          </a:prstGeom>
+          <a:noFill/>
+        </p:spPr>
+        <p:txBody>
+          <a:bodyPr wrap="square" rtlCol="0">
+            <a:spAutoFit/>
+          </a:bodyPr>
+          <a:lstStyle/>
+          <a:p>
+            <a:r>
+              <a:rPr lang="en-US" b="1" dirty="0"/>
+              <a:t>Normal Condition (First Stage)</a:t>
+            </a:r>
+          </a:p>
+          <a:p>
+            <a:r>
+              <a:rPr lang="en-US" dirty="0"/>
+              <a:t>At the beginning:</a:t>
+            </a:r>
+          </a:p>
+          <a:p>
+            <a:pPr marL="285750" indent="-285750">
+              <a:buFont typeface="Arial" panose="020B0604020202020204" pitchFamily="34" charset="0"/>
+              <a:buChar char="•"/>
+            </a:pPr>
+            <a:r>
+              <a:rPr lang="en-US" dirty="0"/>
+              <a:t>bpm = 50 (hex 32)</a:t>
+            </a:r>
+          </a:p>
+          <a:p>
+            <a:pPr marL="285750" indent="-285750">
+              <a:buFont typeface="Arial" panose="020B0604020202020204" pitchFamily="34" charset="0"/>
+              <a:buChar char="•"/>
+            </a:pPr>
+            <a:r>
+              <a:rPr lang="en-US" dirty="0"/>
+              <a:t>resp = 16</a:t>
+            </a:r>
+          </a:p>
+          <a:p>
+            <a:pPr marL="285750" indent="-285750">
+              <a:buFont typeface="Arial" panose="020B0604020202020204" pitchFamily="34" charset="0"/>
+              <a:buChar char="•"/>
+            </a:pPr>
+            <a:r>
+              <a:rPr lang="en-US" dirty="0" err="1"/>
+              <a:t>temp_c</a:t>
+            </a:r>
+            <a:r>
+              <a:rPr lang="en-US" dirty="0"/>
+              <a:t> = 37</a:t>
+            </a:r>
+          </a:p>
+          <a:p>
+            <a:pPr marL="285750" indent="-285750">
+              <a:buFont typeface="Arial" panose="020B0604020202020204" pitchFamily="34" charset="0"/>
+              <a:buChar char="•"/>
+            </a:pPr>
+            <a:r>
+              <a:rPr lang="en-US" dirty="0"/>
+              <a:t>sys = 110</a:t>
+            </a:r>
+          </a:p>
+          <a:p>
+            <a:pPr marL="285750" indent="-285750">
+              <a:buFont typeface="Arial" panose="020B0604020202020204" pitchFamily="34" charset="0"/>
+              <a:buChar char="•"/>
+            </a:pPr>
+            <a:r>
+              <a:rPr lang="en-US" dirty="0" err="1"/>
+              <a:t>dia</a:t>
+            </a:r>
+            <a:r>
+              <a:rPr lang="en-US" dirty="0"/>
+              <a:t> = 70</a:t>
+            </a:r>
+          </a:p>
+          <a:p>
+            <a:r>
+              <a:rPr lang="en-US" dirty="0"/>
+              <a:t>All values are </a:t>
+            </a:r>
+            <a:r>
+              <a:rPr lang="en-US" b="1" dirty="0"/>
+              <a:t>inside normal medical ranges</a:t>
+            </a:r>
+            <a:r>
+              <a:rPr lang="en-US" dirty="0"/>
+              <a:t>, therefore:</a:t>
+            </a:r>
+          </a:p>
+          <a:p>
+            <a:pPr marL="285750" indent="-285750">
+              <a:buFont typeface="Arial" panose="020B0604020202020204" pitchFamily="34" charset="0"/>
+              <a:buChar char="•"/>
+            </a:pPr>
+            <a:r>
+              <a:rPr lang="en-US" dirty="0" err="1"/>
+              <a:t>p_ab</a:t>
+            </a:r>
+            <a:r>
+              <a:rPr lang="en-US" dirty="0"/>
+              <a:t> = </a:t>
+            </a:r>
+          </a:p>
+          <a:p>
+            <a:pPr marL="285750" indent="-285750">
+              <a:buFont typeface="Arial" panose="020B0604020202020204" pitchFamily="34" charset="0"/>
+              <a:buChar char="•"/>
+            </a:pPr>
+            <a:r>
+              <a:rPr lang="en-US" dirty="0" err="1"/>
+              <a:t>r_ab</a:t>
+            </a:r>
+            <a:r>
+              <a:rPr lang="en-US" dirty="0"/>
+              <a:t> = 0</a:t>
+            </a:r>
+          </a:p>
+          <a:p>
+            <a:pPr marL="285750" indent="-285750">
+              <a:buFont typeface="Arial" panose="020B0604020202020204" pitchFamily="34" charset="0"/>
+              <a:buChar char="•"/>
+            </a:pPr>
+            <a:r>
+              <a:rPr lang="en-US" dirty="0" err="1"/>
+              <a:t>t_ab</a:t>
+            </a:r>
+            <a:r>
+              <a:rPr lang="en-US" dirty="0"/>
+              <a:t> = 0</a:t>
+            </a:r>
+          </a:p>
+          <a:p>
+            <a:pPr marL="285750" indent="-285750">
+              <a:buFont typeface="Arial" panose="020B0604020202020204" pitchFamily="34" charset="0"/>
+              <a:buChar char="•"/>
+            </a:pPr>
+            <a:r>
+              <a:rPr lang="en-US" dirty="0" err="1"/>
+              <a:t>bp_ab</a:t>
+            </a:r>
+            <a:r>
+              <a:rPr lang="en-US" dirty="0"/>
+              <a:t> = 0</a:t>
+            </a:r>
+          </a:p>
+          <a:p>
+            <a:pPr marL="285750" indent="-285750">
+              <a:buFont typeface="Arial" panose="020B0604020202020204" pitchFamily="34" charset="0"/>
+              <a:buChar char="•"/>
+            </a:pPr>
+            <a:r>
+              <a:rPr lang="en-US" dirty="0" err="1"/>
+              <a:t>abnormal_final</a:t>
+            </a:r>
+            <a:r>
+              <a:rPr lang="en-US" dirty="0"/>
+              <a:t> = 0</a:t>
+            </a:r>
+          </a:p>
+          <a:p>
+            <a:r>
+              <a:rPr lang="en-US" dirty="0"/>
+              <a:t>➡️ </a:t>
+            </a:r>
+            <a:r>
+              <a:rPr lang="en-US" b="1" dirty="0"/>
+              <a:t>Patient is Normal</a:t>
+            </a:r>
+            <a:endParaRPr lang="en-US" dirty="0"/>
+          </a:p>
+          <a:p>
+            <a:endParaRPr lang="en-US" dirty="0"/>
+          </a:p>
+        </p:txBody>
+      </p:sp>
+      <p:sp>
+        <p:nvSpPr>
+          <p:cNvPr id="6" name="TextBox 5">
+            <a:extLst>
+              <a:ext uri="{FF2B5EF4-FFF2-40B4-BE49-F238E27FC236}">
+                <a16:creationId xmlns:a16="http://schemas.microsoft.com/office/drawing/2014/main" id="{914C580A-D039-8363-6657-D36AC5D9EE62}"/>
+              </a:ext>
+            </a:extLst>
+          </p:cNvPr>
+          <p:cNvSpPr txBox="1"/>
+          <p:nvPr/>
+        </p:nvSpPr>
+        <p:spPr>
+          <a:xfrm>
+            <a:off x="4645152" y="667512"/>
+            <a:ext cx="4262840" cy="3539430"/>
+          </a:xfrm>
+          <a:prstGeom prst="rect">
+            <a:avLst/>
+          </a:prstGeom>
+          <a:noFill/>
+        </p:spPr>
+        <p:txBody>
+          <a:bodyPr wrap="square" rtlCol="0">
+            <a:spAutoFit/>
+          </a:bodyPr>
+          <a:lstStyle/>
+          <a:p>
+            <a:r>
+              <a:rPr lang="en-US" b="1" dirty="0"/>
+              <a:t>When BPM becomes abnormal</a:t>
+            </a:r>
+          </a:p>
+          <a:p>
+            <a:r>
+              <a:rPr lang="en-US" dirty="0"/>
+              <a:t>Later, BPM transitions from 0x32 (50) to 0x64 (100), then above the upper limit.</a:t>
+            </a:r>
+          </a:p>
+          <a:p>
+            <a:r>
+              <a:rPr lang="en-US" dirty="0"/>
+              <a:t>When BPM &gt; 100:</a:t>
+            </a:r>
+          </a:p>
+          <a:p>
+            <a:pPr marL="285750" indent="-285750">
+              <a:buFont typeface="Arial" panose="020B0604020202020204" pitchFamily="34" charset="0"/>
+              <a:buChar char="•"/>
+            </a:pPr>
+            <a:r>
+              <a:rPr lang="en-US" dirty="0" err="1"/>
+              <a:t>p_ab</a:t>
+            </a:r>
+            <a:r>
+              <a:rPr lang="en-US" dirty="0"/>
+              <a:t> becomes </a:t>
+            </a:r>
+            <a:r>
+              <a:rPr lang="en-US" b="1" dirty="0"/>
+              <a:t>1</a:t>
+            </a:r>
+            <a:endParaRPr lang="en-US" dirty="0"/>
+          </a:p>
+          <a:p>
+            <a:pPr marL="285750" indent="-285750">
+              <a:buFont typeface="Arial" panose="020B0604020202020204" pitchFamily="34" charset="0"/>
+              <a:buChar char="•"/>
+            </a:pPr>
+            <a:r>
+              <a:rPr lang="en-US" dirty="0" err="1"/>
+              <a:t>abnormal_final</a:t>
+            </a:r>
+            <a:r>
+              <a:rPr lang="en-US" dirty="0"/>
+              <a:t> also becomes </a:t>
+            </a:r>
+            <a:r>
+              <a:rPr lang="en-US" b="1" dirty="0"/>
+              <a:t>1</a:t>
+            </a:r>
+            <a:endParaRPr lang="en-US" dirty="0"/>
+          </a:p>
+          <a:p>
+            <a:r>
+              <a:rPr lang="en-US" dirty="0"/>
+              <a:t>This appears in your waveform exactly at the moment BPM reaches the abnormal range.</a:t>
+            </a:r>
+          </a:p>
+          <a:p>
+            <a:r>
+              <a:rPr lang="en-US" dirty="0"/>
+              <a:t>➡️ </a:t>
+            </a:r>
+            <a:r>
+              <a:rPr lang="en-US" b="1" dirty="0"/>
+              <a:t>High Heart Rate Alert Activated</a:t>
+            </a:r>
+          </a:p>
+          <a:p>
+            <a:endParaRPr lang="en-US" b="1" dirty="0"/>
+          </a:p>
+          <a:p>
+            <a:r>
+              <a:rPr lang="en-US" b="1" dirty="0"/>
+              <a:t>When Respiration Rate becomes abnormal</a:t>
+            </a:r>
+          </a:p>
+          <a:p>
+            <a:r>
+              <a:rPr lang="en-US" dirty="0"/>
+              <a:t>Respiratory rate changes to 10 (below the normal threshold 12).</a:t>
+            </a:r>
+          </a:p>
+          <a:p>
+            <a:pPr marL="285750" indent="-285750">
+              <a:buFont typeface="Arial" panose="020B0604020202020204" pitchFamily="34" charset="0"/>
+              <a:buChar char="•"/>
+            </a:pPr>
+            <a:r>
+              <a:rPr lang="en-US" dirty="0" err="1"/>
+              <a:t>r_ab</a:t>
+            </a:r>
+            <a:r>
+              <a:rPr lang="en-US" dirty="0"/>
+              <a:t> = 1</a:t>
+            </a:r>
+          </a:p>
+          <a:p>
+            <a:pPr marL="285750" indent="-285750">
+              <a:buFont typeface="Arial" panose="020B0604020202020204" pitchFamily="34" charset="0"/>
+              <a:buChar char="•"/>
+            </a:pPr>
+            <a:r>
+              <a:rPr lang="en-US" dirty="0" err="1"/>
+              <a:t>abnormal_final</a:t>
+            </a:r>
+            <a:r>
+              <a:rPr lang="en-US" dirty="0"/>
+              <a:t> remains </a:t>
+            </a:r>
+            <a:r>
+              <a:rPr lang="en-US" b="1" dirty="0"/>
+              <a:t>1</a:t>
+            </a:r>
+            <a:endParaRPr lang="en-US" dirty="0"/>
+          </a:p>
+          <a:p>
+            <a:r>
+              <a:rPr lang="en-US" dirty="0"/>
+              <a:t>➡️ </a:t>
+            </a:r>
+            <a:r>
+              <a:rPr lang="en-US" b="1" dirty="0"/>
+              <a:t>Low Respiration Alert Activated</a:t>
+            </a:r>
+            <a:endParaRPr lang="en-US" dirty="0"/>
+          </a:p>
+        </p:txBody>
+      </p:sp>
+      <p:sp>
+        <p:nvSpPr>
+          <p:cNvPr id="7" name="TextBox 6">
+            <a:extLst>
+              <a:ext uri="{FF2B5EF4-FFF2-40B4-BE49-F238E27FC236}">
+                <a16:creationId xmlns:a16="http://schemas.microsoft.com/office/drawing/2014/main" id="{48F6D707-7584-CC29-AB21-1D7A5CF6164B}"/>
+              </a:ext>
+            </a:extLst>
+          </p:cNvPr>
+          <p:cNvSpPr txBox="1"/>
+          <p:nvPr/>
+        </p:nvSpPr>
+        <p:spPr>
+          <a:xfrm>
+            <a:off x="8750808" y="667512"/>
+            <a:ext cx="3441192" cy="3754874"/>
+          </a:xfrm>
+          <a:prstGeom prst="rect">
+            <a:avLst/>
+          </a:prstGeom>
+          <a:noFill/>
+        </p:spPr>
+        <p:txBody>
+          <a:bodyPr wrap="square" rtlCol="0">
+            <a:spAutoFit/>
+          </a:bodyPr>
+          <a:lstStyle/>
+          <a:p>
+            <a:r>
+              <a:rPr lang="en-US" b="1" dirty="0"/>
+              <a:t>When Temperature becomes abnormal</a:t>
+            </a:r>
+          </a:p>
+          <a:p>
+            <a:r>
+              <a:rPr lang="en-US" dirty="0"/>
+              <a:t>Temperature drops to 23°C:</a:t>
+            </a:r>
+          </a:p>
+          <a:p>
+            <a:pPr marL="285750" indent="-285750">
+              <a:buFont typeface="Arial" panose="020B0604020202020204" pitchFamily="34" charset="0"/>
+              <a:buChar char="•"/>
+            </a:pPr>
+            <a:r>
+              <a:rPr lang="en-US" dirty="0" err="1"/>
+              <a:t>t_ab</a:t>
+            </a:r>
+            <a:r>
+              <a:rPr lang="en-US" dirty="0"/>
+              <a:t> = 1</a:t>
+            </a:r>
+          </a:p>
+          <a:p>
+            <a:pPr marL="285750" indent="-285750">
+              <a:buFont typeface="Arial" panose="020B0604020202020204" pitchFamily="34" charset="0"/>
+              <a:buChar char="•"/>
+            </a:pPr>
+            <a:r>
+              <a:rPr lang="en-US" dirty="0" err="1"/>
+              <a:t>abnormal_final</a:t>
+            </a:r>
+            <a:r>
+              <a:rPr lang="en-US" dirty="0"/>
+              <a:t> = 1</a:t>
+            </a:r>
+          </a:p>
+          <a:p>
+            <a:r>
+              <a:rPr lang="en-US" dirty="0"/>
+              <a:t>➡️ </a:t>
+            </a:r>
+            <a:r>
+              <a:rPr lang="en-US" b="1" dirty="0"/>
+              <a:t>Low Body Temperature Alert Activated</a:t>
+            </a:r>
+            <a:endParaRPr lang="en-US" dirty="0"/>
+          </a:p>
+          <a:p>
+            <a:endParaRPr lang="en-US" dirty="0"/>
+          </a:p>
+          <a:p>
+            <a:r>
+              <a:rPr lang="en-US" b="1" dirty="0"/>
+              <a:t>When Blood Pressure becomes abnormal</a:t>
+            </a:r>
+          </a:p>
+          <a:p>
+            <a:r>
+              <a:rPr lang="en-US" dirty="0"/>
+              <a:t>Sys = 0x6E (110) is normal</a:t>
+            </a:r>
+            <a:br>
+              <a:rPr lang="en-US" dirty="0"/>
+            </a:br>
+            <a:r>
+              <a:rPr lang="en-US" dirty="0"/>
+              <a:t>Dia = 0x46 (70) is normal</a:t>
+            </a:r>
+          </a:p>
+          <a:p>
+            <a:r>
+              <a:rPr lang="en-US" dirty="0"/>
+              <a:t>But when BP values change to abnormal thresholds in next cycles:</a:t>
+            </a:r>
+          </a:p>
+          <a:p>
+            <a:pPr marL="285750" indent="-285750">
+              <a:buFont typeface="Arial" panose="020B0604020202020204" pitchFamily="34" charset="0"/>
+              <a:buChar char="•"/>
+            </a:pPr>
+            <a:r>
+              <a:rPr lang="en-US" dirty="0" err="1"/>
+              <a:t>bp_ab</a:t>
+            </a:r>
+            <a:r>
+              <a:rPr lang="en-US" dirty="0"/>
+              <a:t> = 1</a:t>
+            </a:r>
+          </a:p>
+          <a:p>
+            <a:pPr marL="285750" indent="-285750">
+              <a:buFont typeface="Arial" panose="020B0604020202020204" pitchFamily="34" charset="0"/>
+              <a:buChar char="•"/>
+            </a:pPr>
+            <a:r>
+              <a:rPr lang="en-US" dirty="0" err="1"/>
+              <a:t>abnormal_final</a:t>
+            </a:r>
+            <a:r>
+              <a:rPr lang="en-US" dirty="0"/>
+              <a:t> = 1</a:t>
+            </a:r>
+          </a:p>
+          <a:p>
+            <a:r>
+              <a:rPr lang="en-US" dirty="0"/>
+              <a:t>➡️ </a:t>
+            </a:r>
+            <a:r>
+              <a:rPr lang="en-US" b="1" dirty="0"/>
+              <a:t>BP Alert Activated</a:t>
+            </a:r>
+            <a:endParaRPr lang="en-US" dirty="0"/>
+          </a:p>
+        </p:txBody>
+      </p:sp>
+      <p:sp>
+        <p:nvSpPr>
+          <p:cNvPr id="8" name="TextBox 7">
+            <a:extLst>
+              <a:ext uri="{FF2B5EF4-FFF2-40B4-BE49-F238E27FC236}">
+                <a16:creationId xmlns:a16="http://schemas.microsoft.com/office/drawing/2014/main" id="{DDCE3D19-9BA5-10A2-C9FC-64B3D726D674}"/>
+              </a:ext>
+            </a:extLst>
+          </p:cNvPr>
+          <p:cNvSpPr txBox="1"/>
+          <p:nvPr/>
+        </p:nvSpPr>
+        <p:spPr>
+          <a:xfrm>
+            <a:off x="0" y="4246106"/>
+            <a:ext cx="12191999" cy="2246769"/>
+          </a:xfrm>
+          <a:prstGeom prst="rect">
+            <a:avLst/>
+          </a:prstGeom>
+          <a:noFill/>
+        </p:spPr>
+        <p:txBody>
+          <a:bodyPr wrap="square" rtlCol="0">
+            <a:spAutoFit/>
+          </a:bodyPr>
+          <a:lstStyle/>
+          <a:p>
+            <a:r>
+              <a:rPr lang="en-US" dirty="0"/>
+              <a:t>“In this simulation, we tested the four major vital sign monitors.</a:t>
+            </a:r>
+            <a:br>
+              <a:rPr lang="en-US" dirty="0"/>
+            </a:br>
+            <a:r>
+              <a:rPr lang="en-US" dirty="0"/>
+              <a:t>Each parameter has predefined medical normal ranges.</a:t>
+            </a:r>
+          </a:p>
+          <a:p>
+            <a:r>
+              <a:rPr lang="en-US" dirty="0"/>
+              <a:t>During the simulation:</a:t>
+            </a:r>
+          </a:p>
+          <a:p>
+            <a:pPr marL="285750" indent="-285750">
+              <a:buFont typeface="Arial" panose="020B0604020202020204" pitchFamily="34" charset="0"/>
+              <a:buChar char="•"/>
+            </a:pPr>
+            <a:r>
+              <a:rPr lang="en-US" dirty="0"/>
+              <a:t>When parameters were within range, all abnormal flags remained </a:t>
+            </a:r>
+            <a:r>
+              <a:rPr lang="en-US" b="1" dirty="0"/>
+              <a:t>0</a:t>
+            </a:r>
+            <a:endParaRPr lang="en-US" dirty="0"/>
+          </a:p>
+          <a:p>
+            <a:pPr marL="285750" indent="-285750">
+              <a:buFont typeface="Arial" panose="020B0604020202020204" pitchFamily="34" charset="0"/>
+              <a:buChar char="•"/>
+            </a:pPr>
+            <a:r>
+              <a:rPr lang="en-US" dirty="0"/>
+              <a:t>When any parameter exceeded the threshold, its corresponding abnormal flag became </a:t>
+            </a:r>
+            <a:r>
+              <a:rPr lang="en-US" b="1" dirty="0"/>
+              <a:t>1</a:t>
+            </a:r>
+            <a:endParaRPr lang="en-US" dirty="0"/>
+          </a:p>
+          <a:p>
+            <a:pPr marL="285750" indent="-285750">
+              <a:buFont typeface="Arial" panose="020B0604020202020204" pitchFamily="34" charset="0"/>
+              <a:buChar char="•"/>
+            </a:pPr>
+            <a:r>
+              <a:rPr lang="en-US" dirty="0"/>
+              <a:t>The final signal </a:t>
+            </a:r>
+            <a:r>
+              <a:rPr lang="en-US" dirty="0" err="1"/>
+              <a:t>abnormal_final</a:t>
+            </a:r>
+            <a:r>
+              <a:rPr lang="en-US" dirty="0"/>
+              <a:t> is an OR combination of all individual abnormal flags</a:t>
+            </a:r>
+          </a:p>
+          <a:p>
+            <a:pPr marL="285750" indent="-285750">
+              <a:buFont typeface="Arial" panose="020B0604020202020204" pitchFamily="34" charset="0"/>
+              <a:buChar char="•"/>
+            </a:pPr>
+            <a:r>
+              <a:rPr lang="en-US" dirty="0"/>
+              <a:t>So, if ANY vital sign becomes abnormal, the system immediately detects and reports it</a:t>
+            </a:r>
+          </a:p>
+          <a:p>
+            <a:r>
+              <a:rPr lang="en-US" dirty="0"/>
+              <a:t>This simulates the behavior of our FPGA-based patient monitoring system in the health tracking project. The waveforms confirm that the logic works correctly.”</a:t>
+            </a:r>
+          </a:p>
+          <a:p>
+            <a:endParaRPr lang="en-US" dirty="0"/>
+          </a:p>
+        </p:txBody>
+      </p:sp>
+    </p:spTree>
+    <p:extLst>
+      <p:ext uri="{BB962C8B-B14F-4D97-AF65-F5344CB8AC3E}">
+        <p14:creationId xmlns:p14="http://schemas.microsoft.com/office/powerpoint/2010/main" val="3254685343"/>
+      </p:ext>
+    </p:extLst>
+  </p:cSld>
+  <p:clrMapOvr>
+    <a:masterClrMapping/>
+  </p:clrMapOvr>
+</p:sld>
+</file>
+
+<file path=ppt/slides/slide12.xml><?xml version="1.0" encoding="utf-8"?>
+<p:sld xmlns:a="http://schemas.openxmlformats.org/drawingml/2006/main" xmlns:r="http://schemas.openxmlformats.org/officeDocument/2006/relationships" xmlns:p="http://schemas.openxmlformats.org/presentationml/2006/main">
+  <p:cSld>
+    <p:spTree>
+      <p:nvGrpSpPr>
+        <p:cNvPr id="1" name="">
+          <a:extLst>
+            <a:ext uri="{FF2B5EF4-FFF2-40B4-BE49-F238E27FC236}">
               <a16:creationId xmlns:a16="http://schemas.microsoft.com/office/drawing/2014/main" id="{B7EA98FA-4F35-C93F-73A2-485950D05BBB}"/>
             </a:ext>
           </a:extLst>
@@ -8160,7 +8935,7 @@
             </a:pPr>
             <a:fld id="{00000000-1234-1234-1234-123412341234}" type="slidenum">
               <a:rPr lang="en-US" smtClean="0"/>
-              <a:t>11</a:t>
+              <a:t>12</a:t>
             </a:fld>
             <a:endParaRPr lang="en-US" dirty="0"/>
           </a:p>
@@ -8541,7 +9316,7 @@
 </p:sld>
 </file>
 
-<file path=ppt/slides/slide12.xml><?xml version="1.0" encoding="utf-8"?>
+<file path=ppt/slides/slide13.xml><?xml version="1.0" encoding="utf-8"?>
 <p:sld xmlns:a="http://schemas.openxmlformats.org/drawingml/2006/main" xmlns:r="http://schemas.openxmlformats.org/officeDocument/2006/relationships" xmlns:p="http://schemas.openxmlformats.org/presentationml/2006/main">
   <p:cSld>
     <p:spTree>

</xml_diff>